<commit_message>
Added in a user profile screenshot and some text.
</commit_message>
<xml_diff>
--- a/TradesmenDirectory.pptx
+++ b/TradesmenDirectory.pptx
@@ -5,18 +5,20 @@
     <p:sldMasterId id="2147483684" r:id="rId2"/>
   </p:sldMasterIdLst>
   <p:notesMasterIdLst>
-    <p:notesMasterId r:id="rId9"/>
+    <p:notesMasterId r:id="rId11"/>
   </p:notesMasterIdLst>
   <p:handoutMasterIdLst>
-    <p:handoutMasterId r:id="rId10"/>
+    <p:handoutMasterId r:id="rId12"/>
   </p:handoutMasterIdLst>
   <p:sldIdLst>
     <p:sldId id="270" r:id="rId3"/>
     <p:sldId id="271" r:id="rId4"/>
     <p:sldId id="277" r:id="rId5"/>
-    <p:sldId id="275" r:id="rId6"/>
-    <p:sldId id="276" r:id="rId7"/>
-    <p:sldId id="278" r:id="rId8"/>
+    <p:sldId id="282" r:id="rId6"/>
+    <p:sldId id="279" r:id="rId7"/>
+    <p:sldId id="280" r:id="rId8"/>
+    <p:sldId id="281" r:id="rId9"/>
+    <p:sldId id="278" r:id="rId10"/>
   </p:sldIdLst>
   <p:sldSz cx="12192000" cy="6858000"/>
   <p:notesSz cx="6858000" cy="9144000"/>
@@ -224,7 +226,7 @@
           <a:p>
             <a:fld id="{C9DC3787-D225-4F78-8E71-4DD8FC1EC8F1}" type="datetimeFigureOut">
               <a:rPr lang="en-US" smtClean="0"/>
-              <a:t>11/27/2015</a:t>
+              <a:t>11/30/2015</a:t>
             </a:fld>
             <a:endParaRPr lang="en-US"/>
           </a:p>
@@ -389,7 +391,7 @@
           <a:p>
             <a:fld id="{459E625E-096F-494B-B7CE-A49E276A3A39}" type="datetimeFigureOut">
               <a:rPr lang="en-US" smtClean="0"/>
-              <a:t>11/27/2015</a:t>
+              <a:t>11/30/2015</a:t>
             </a:fld>
             <a:endParaRPr lang="en-US"/>
           </a:p>
@@ -732,90 +734,6 @@
     <p:extLst>
       <p:ext uri="{BB962C8B-B14F-4D97-AF65-F5344CB8AC3E}">
         <p14:creationId xmlns:p14="http://schemas.microsoft.com/office/powerpoint/2010/main" val="3938237878"/>
-      </p:ext>
-    </p:extLst>
-  </p:cSld>
-  <p:clrMapOvr>
-    <a:masterClrMapping/>
-  </p:clrMapOvr>
-</p:notes>
-</file>
-
-<file path=ppt/notesSlides/notesSlide2.xml><?xml version="1.0" encoding="utf-8"?>
-<p:notes xmlns:a="http://schemas.openxmlformats.org/drawingml/2006/main" xmlns:r="http://schemas.openxmlformats.org/officeDocument/2006/relationships" xmlns:p="http://schemas.openxmlformats.org/presentationml/2006/main">
-  <p:cSld>
-    <p:spTree>
-      <p:nvGrpSpPr>
-        <p:cNvPr id="1" name=""/>
-        <p:cNvGrpSpPr/>
-        <p:nvPr/>
-      </p:nvGrpSpPr>
-      <p:grpSpPr>
-        <a:xfrm>
-          <a:off x="0" y="0"/>
-          <a:ext cx="0" cy="0"/>
-          <a:chOff x="0" y="0"/>
-          <a:chExt cx="0" cy="0"/>
-        </a:xfrm>
-      </p:grpSpPr>
-      <p:sp>
-        <p:nvSpPr>
-          <p:cNvPr id="2" name="Slide Image Placeholder 1"/>
-          <p:cNvSpPr>
-            <a:spLocks noGrp="1" noRot="1" noChangeAspect="1"/>
-          </p:cNvSpPr>
-          <p:nvPr>
-            <p:ph type="sldImg"/>
-          </p:nvPr>
-        </p:nvSpPr>
-        <p:spPr/>
-      </p:sp>
-      <p:sp>
-        <p:nvSpPr>
-          <p:cNvPr id="3" name="Notes Placeholder 2"/>
-          <p:cNvSpPr>
-            <a:spLocks noGrp="1"/>
-          </p:cNvSpPr>
-          <p:nvPr>
-            <p:ph type="body" idx="1"/>
-          </p:nvPr>
-        </p:nvSpPr>
-        <p:spPr/>
-        <p:txBody>
-          <a:bodyPr/>
-          <a:lstStyle/>
-          <a:p>
-            <a:endParaRPr lang="en-US"/>
-          </a:p>
-        </p:txBody>
-      </p:sp>
-      <p:sp>
-        <p:nvSpPr>
-          <p:cNvPr id="4" name="Slide Number Placeholder 3"/>
-          <p:cNvSpPr>
-            <a:spLocks noGrp="1"/>
-          </p:cNvSpPr>
-          <p:nvPr>
-            <p:ph type="sldNum" sz="quarter" idx="10"/>
-          </p:nvPr>
-        </p:nvSpPr>
-        <p:spPr/>
-        <p:txBody>
-          <a:bodyPr/>
-          <a:lstStyle/>
-          <a:p>
-            <a:fld id="{3FA2C895-EB1C-4157-9E46-0DF3298BA9C2}" type="slidenum">
-              <a:rPr lang="en-US" smtClean="0"/>
-              <a:t>5</a:t>
-            </a:fld>
-            <a:endParaRPr lang="en-US"/>
-          </a:p>
-        </p:txBody>
-      </p:sp>
-    </p:spTree>
-    <p:extLst>
-      <p:ext uri="{BB962C8B-B14F-4D97-AF65-F5344CB8AC3E}">
-        <p14:creationId xmlns:p14="http://schemas.microsoft.com/office/powerpoint/2010/main" val="1639685081"/>
       </p:ext>
     </p:extLst>
   </p:cSld>
@@ -3453,7 +3371,7 @@
           <a:p>
             <a:fld id="{35FB4A4D-BEB3-42DE-8D0E-DB8F0B5DA3ED}" type="datetime1">
               <a:rPr lang="en-US" smtClean="0"/>
-              <a:t>11/27/2015</a:t>
+              <a:t>11/30/2015</a:t>
             </a:fld>
             <a:endParaRPr lang="en-US"/>
           </a:p>
@@ -3882,7 +3800,7 @@
           <a:p>
             <a:fld id="{23DA557D-1DB1-46C0-998A-94433545C341}" type="datetime1">
               <a:rPr lang="en-US" smtClean="0"/>
-              <a:t>11/27/2015</a:t>
+              <a:t>11/30/2015</a:t>
             </a:fld>
             <a:endParaRPr lang="en-US"/>
           </a:p>
@@ -4064,7 +3982,7 @@
           <a:p>
             <a:fld id="{979A610B-0B0E-4C6C-A7A6-0853CA34DDCA}" type="datetime1">
               <a:rPr lang="en-US" smtClean="0"/>
-              <a:t>11/27/2015</a:t>
+              <a:t>11/30/2015</a:t>
             </a:fld>
             <a:endParaRPr lang="en-US"/>
           </a:p>
@@ -4256,7 +4174,7 @@
           <a:p>
             <a:fld id="{2FF0C144-8206-4C57-B7F2-12168FDC6C23}" type="datetime1">
               <a:rPr lang="en-US" smtClean="0"/>
-              <a:t>11/27/2015</a:t>
+              <a:t>11/30/2015</a:t>
             </a:fld>
             <a:endParaRPr lang="en-US"/>
           </a:p>
@@ -4438,7 +4356,7 @@
           <a:p>
             <a:fld id="{664C8FB8-1142-402E-8BCA-4DC30F103E56}" type="datetime1">
               <a:rPr lang="en-US" smtClean="0"/>
-              <a:t>11/27/2015</a:t>
+              <a:t>11/30/2015</a:t>
             </a:fld>
             <a:endParaRPr lang="en-US"/>
           </a:p>
@@ -4696,7 +4614,7 @@
           <a:p>
             <a:fld id="{065BCBAD-D360-40D3-A33A-B189CE27C2FB}" type="datetime1">
               <a:rPr lang="en-US" smtClean="0"/>
-              <a:t>11/27/2015</a:t>
+              <a:t>11/30/2015</a:t>
             </a:fld>
             <a:endParaRPr lang="en-US"/>
           </a:p>
@@ -4940,7 +4858,7 @@
           <a:p>
             <a:fld id="{6A93471D-48A1-4899-AFFF-8ACC56D03BF3}" type="datetime1">
               <a:rPr lang="en-US" smtClean="0"/>
-              <a:t>11/27/2015</a:t>
+              <a:t>11/30/2015</a:t>
             </a:fld>
             <a:endParaRPr lang="en-US"/>
           </a:p>
@@ -5382,7 +5300,7 @@
           <a:p>
             <a:fld id="{44400513-7D68-4635-8489-06A9AFAAD13D}" type="datetime1">
               <a:rPr lang="en-US" smtClean="0"/>
-              <a:t>11/27/2015</a:t>
+              <a:t>11/30/2015</a:t>
             </a:fld>
             <a:endParaRPr lang="en-US"/>
           </a:p>
@@ -5512,7 +5430,7 @@
           <a:p>
             <a:fld id="{746736AC-4807-4E91-B671-F9B91617C7B3}" type="datetime1">
               <a:rPr lang="en-US" smtClean="0"/>
-              <a:t>11/27/2015</a:t>
+              <a:t>11/30/2015</a:t>
             </a:fld>
             <a:endParaRPr lang="en-US"/>
           </a:p>
@@ -8180,7 +8098,7 @@
           <a:p>
             <a:fld id="{1222DBCC-10C7-4CB5-9734-C5542D870FBB}" type="datetime1">
               <a:rPr lang="en-US" smtClean="0"/>
-              <a:t>11/27/2015</a:t>
+              <a:t>11/30/2015</a:t>
             </a:fld>
             <a:endParaRPr lang="en-US"/>
           </a:p>
@@ -11235,7 +11153,7 @@
           <a:p>
             <a:fld id="{223346AD-5C1D-4E35-A3CE-CF8952DE9936}" type="datetime1">
               <a:rPr lang="en-US" smtClean="0"/>
-              <a:t>11/27/2015</a:t>
+              <a:t>11/30/2015</a:t>
             </a:fld>
             <a:endParaRPr lang="en-US"/>
           </a:p>
@@ -14153,7 +14071,7 @@
           <a:p>
             <a:fld id="{EED287B1-10B2-498E-AB88-8F08CA169E5C}" type="datetime1">
               <a:rPr lang="en-US" smtClean="0"/>
-              <a:t>11/27/2015</a:t>
+              <a:t>11/30/2015</a:t>
             </a:fld>
             <a:endParaRPr lang="en-US"/>
           </a:p>
@@ -15113,13 +15031,11 @@
           <a:p>
             <a:r>
               <a:rPr lang="en-GB" dirty="0" smtClean="0"/>
-              <a:t>Messaging between consumer/tradesmen</a:t>
+              <a:t>Email </a:t>
             </a:r>
-          </a:p>
-          <a:p>
             <a:r>
               <a:rPr lang="en-GB" dirty="0" smtClean="0"/>
-              <a:t>Email verification</a:t>
+              <a:t>verification</a:t>
             </a:r>
           </a:p>
           <a:p>
@@ -15211,35 +15127,7 @@
       </p:grpSpPr>
       <p:sp>
         <p:nvSpPr>
-          <p:cNvPr id="3" name="Content Placeholder 2"/>
-          <p:cNvSpPr>
-            <a:spLocks noGrp="1"/>
-          </p:cNvSpPr>
-          <p:nvPr>
-            <p:ph idx="1"/>
-          </p:nvPr>
-        </p:nvSpPr>
-        <p:spPr/>
-        <p:txBody>
-          <a:bodyPr/>
-          <a:lstStyle/>
-          <a:p>
-            <a:pPr lvl="0"/>
-            <a:r>
-              <a:rPr lang="en-US" dirty="0" smtClean="0"/>
-              <a:t>Detail the product models available and list specific prices for each model and additional options</a:t>
-            </a:r>
-            <a:r>
-              <a:rPr lang="en-US" dirty="0"/>
-              <a:t>.</a:t>
-            </a:r>
-            <a:endParaRPr lang="en-US" dirty="0" smtClean="0"/>
-          </a:p>
-        </p:txBody>
-      </p:sp>
-      <p:sp>
-        <p:nvSpPr>
-          <p:cNvPr id="2" name="Title 1"/>
+          <p:cNvPr id="3" name="Title 2"/>
           <p:cNvSpPr>
             <a:spLocks noGrp="1"/>
           </p:cNvSpPr>
@@ -15247,23 +15135,59 @@
             <p:ph type="title"/>
           </p:nvPr>
         </p:nvSpPr>
-        <p:spPr/>
+        <p:spPr>
+          <a:xfrm>
+            <a:off x="1391320" y="790223"/>
+            <a:ext cx="9366325" cy="711200"/>
+          </a:xfrm>
+        </p:spPr>
         <p:txBody>
-          <a:bodyPr/>
+          <a:bodyPr>
+            <a:normAutofit/>
+          </a:bodyPr>
           <a:lstStyle/>
           <a:p>
             <a:r>
-              <a:rPr lang="en-US" dirty="0" smtClean="0"/>
-              <a:t>Pricing</a:t>
+              <a:rPr lang="en-GB" dirty="0" smtClean="0"/>
+              <a:t>Custom user profile</a:t>
             </a:r>
             <a:endParaRPr lang="en-US" dirty="0"/>
           </a:p>
         </p:txBody>
       </p:sp>
+      <p:pic>
+        <p:nvPicPr>
+          <p:cNvPr id="6" name="Content Placeholder 5"/>
+          <p:cNvPicPr>
+            <a:picLocks noGrp="1" noChangeAspect="1"/>
+          </p:cNvPicPr>
+          <p:nvPr>
+            <p:ph idx="1"/>
+          </p:nvPr>
+        </p:nvPicPr>
+        <p:blipFill>
+          <a:blip r:embed="rId2">
+            <a:extLst>
+              <a:ext uri="{28A0092B-C50C-407E-A947-70E740481C1C}">
+                <a14:useLocalDpi xmlns:a14="http://schemas.microsoft.com/office/drawing/2010/main" val="0"/>
+              </a:ext>
+            </a:extLst>
+          </a:blip>
+          <a:stretch>
+            <a:fillRect/>
+          </a:stretch>
+        </p:blipFill>
+        <p:spPr>
+          <a:xfrm>
+            <a:off x="1503146" y="1460430"/>
+            <a:ext cx="8656854" cy="4867104"/>
+          </a:xfrm>
+        </p:spPr>
+      </p:pic>
     </p:spTree>
     <p:extLst>
       <p:ext uri="{BB962C8B-B14F-4D97-AF65-F5344CB8AC3E}">
-        <p14:creationId xmlns:p14="http://schemas.microsoft.com/office/powerpoint/2010/main" val="826694664"/>
+        <p14:creationId xmlns:p14="http://schemas.microsoft.com/office/powerpoint/2010/main" val="347352577"/>
       </p:ext>
     </p:extLst>
   </p:cSld>
@@ -15311,7 +15235,7 @@
       </p:grpSpPr>
       <p:sp>
         <p:nvSpPr>
-          <p:cNvPr id="3" name="Content Placeholder 2"/>
+          <p:cNvPr id="2" name="Content Placeholder 1"/>
           <p:cNvSpPr>
             <a:spLocks noGrp="1"/>
           </p:cNvSpPr>
@@ -15324,29 +15248,28 @@
           <a:bodyPr/>
           <a:lstStyle/>
           <a:p>
-            <a:pPr lvl="0"/>
             <a:r>
-              <a:rPr lang="en-US" dirty="0" smtClean="0"/>
-              <a:t>List availability dates.</a:t>
+              <a:rPr lang="en-GB" dirty="0" smtClean="0"/>
+              <a:t>On each individual tradesmen profile is a section for feedback.</a:t>
             </a:r>
           </a:p>
           <a:p>
-            <a:pPr lvl="0"/>
             <a:r>
-              <a:rPr lang="en-US" dirty="0" smtClean="0"/>
-              <a:t>Describe where product can be purchased, or where to direct orders</a:t>
+              <a:rPr lang="en-GB" dirty="0" smtClean="0"/>
+              <a:t>Consumers who have hired a tradesmen, can leave feedback once a job is completed.</a:t>
             </a:r>
+          </a:p>
+          <a:p>
             <a:r>
-              <a:rPr lang="en-US" dirty="0"/>
-              <a:t>.</a:t>
+              <a:rPr lang="en-GB" dirty="0" smtClean="0"/>
+              <a:t>When comparing some of the sites out there, we found this feature lacing in many of them.</a:t>
             </a:r>
-            <a:endParaRPr lang="en-US" dirty="0" smtClean="0"/>
           </a:p>
         </p:txBody>
       </p:sp>
       <p:sp>
         <p:nvSpPr>
-          <p:cNvPr id="2" name="Title 1"/>
+          <p:cNvPr id="3" name="Title 2"/>
           <p:cNvSpPr>
             <a:spLocks noGrp="1"/>
           </p:cNvSpPr>
@@ -15360,8 +15283,8 @@
           <a:lstStyle/>
           <a:p>
             <a:r>
-              <a:rPr lang="en-US" smtClean="0"/>
-              <a:t>Availability</a:t>
+              <a:rPr lang="en-GB" dirty="0" smtClean="0"/>
+              <a:t>Consumer Feedback</a:t>
             </a:r>
             <a:endParaRPr lang="en-US" dirty="0"/>
           </a:p>
@@ -15370,7 +15293,7 @@
     </p:spTree>
     <p:extLst>
       <p:ext uri="{BB962C8B-B14F-4D97-AF65-F5344CB8AC3E}">
-        <p14:creationId xmlns:p14="http://schemas.microsoft.com/office/powerpoint/2010/main" val="3724102236"/>
+        <p14:creationId xmlns:p14="http://schemas.microsoft.com/office/powerpoint/2010/main" val="2853325974"/>
       </p:ext>
     </p:extLst>
   </p:cSld>
@@ -15400,6 +15323,181 @@
 </file>
 
 <file path=ppt/slides/slide6.xml><?xml version="1.0" encoding="utf-8"?>
+<p:sld xmlns:a="http://schemas.openxmlformats.org/drawingml/2006/main" xmlns:r="http://schemas.openxmlformats.org/officeDocument/2006/relationships" xmlns:p="http://schemas.openxmlformats.org/presentationml/2006/main">
+  <p:cSld>
+    <p:spTree>
+      <p:nvGrpSpPr>
+        <p:cNvPr id="1" name=""/>
+        <p:cNvGrpSpPr/>
+        <p:nvPr/>
+      </p:nvGrpSpPr>
+      <p:grpSpPr>
+        <a:xfrm>
+          <a:off x="0" y="0"/>
+          <a:ext cx="0" cy="0"/>
+          <a:chOff x="0" y="0"/>
+          <a:chExt cx="0" cy="0"/>
+        </a:xfrm>
+      </p:grpSpPr>
+      <p:sp>
+        <p:nvSpPr>
+          <p:cNvPr id="2" name="Content Placeholder 1"/>
+          <p:cNvSpPr>
+            <a:spLocks noGrp="1"/>
+          </p:cNvSpPr>
+          <p:nvPr>
+            <p:ph idx="1"/>
+          </p:nvPr>
+        </p:nvSpPr>
+        <p:spPr/>
+        <p:txBody>
+          <a:bodyPr/>
+          <a:lstStyle/>
+          <a:p>
+            <a:r>
+              <a:rPr lang="en-GB" dirty="0" smtClean="0"/>
+              <a:t>Verified consumers will have the ability to advertise jobs on the job board, where tradesmen can reply back to them.</a:t>
+            </a:r>
+          </a:p>
+        </p:txBody>
+      </p:sp>
+      <p:sp>
+        <p:nvSpPr>
+          <p:cNvPr id="3" name="Title 2"/>
+          <p:cNvSpPr>
+            <a:spLocks noGrp="1"/>
+          </p:cNvSpPr>
+          <p:nvPr>
+            <p:ph type="title"/>
+          </p:nvPr>
+        </p:nvSpPr>
+        <p:spPr/>
+        <p:txBody>
+          <a:bodyPr/>
+          <a:lstStyle/>
+          <a:p>
+            <a:r>
+              <a:rPr lang="en-GB" dirty="0" smtClean="0"/>
+              <a:t>Jobs Board</a:t>
+            </a:r>
+            <a:endParaRPr lang="en-US" dirty="0"/>
+          </a:p>
+        </p:txBody>
+      </p:sp>
+    </p:spTree>
+    <p:extLst>
+      <p:ext uri="{BB962C8B-B14F-4D97-AF65-F5344CB8AC3E}">
+        <p14:creationId xmlns:p14="http://schemas.microsoft.com/office/powerpoint/2010/main" val="2526348329"/>
+      </p:ext>
+    </p:extLst>
+  </p:cSld>
+  <p:clrMapOvr>
+    <a:masterClrMapping/>
+  </p:clrMapOvr>
+  <mc:AlternateContent xmlns:mc="http://schemas.openxmlformats.org/markup-compatibility/2006" xmlns:p14="http://schemas.microsoft.com/office/powerpoint/2010/main">
+    <mc:Choice Requires="p14">
+      <p:transition spd="med" p14:dur="700">
+        <p:fade/>
+      </p:transition>
+    </mc:Choice>
+    <mc:Fallback xmlns="">
+      <p:transition spd="med">
+        <p:fade/>
+      </p:transition>
+    </mc:Fallback>
+  </mc:AlternateContent>
+</p:sld>
+</file>
+
+<file path=ppt/slides/slide7.xml><?xml version="1.0" encoding="utf-8"?>
+<p:sld xmlns:a="http://schemas.openxmlformats.org/drawingml/2006/main" xmlns:r="http://schemas.openxmlformats.org/officeDocument/2006/relationships" xmlns:p="http://schemas.openxmlformats.org/presentationml/2006/main">
+  <p:cSld>
+    <p:spTree>
+      <p:nvGrpSpPr>
+        <p:cNvPr id="1" name=""/>
+        <p:cNvGrpSpPr/>
+        <p:nvPr/>
+      </p:nvGrpSpPr>
+      <p:grpSpPr>
+        <a:xfrm>
+          <a:off x="0" y="0"/>
+          <a:ext cx="0" cy="0"/>
+          <a:chOff x="0" y="0"/>
+          <a:chExt cx="0" cy="0"/>
+        </a:xfrm>
+      </p:grpSpPr>
+      <p:sp>
+        <p:nvSpPr>
+          <p:cNvPr id="2" name="Content Placeholder 1"/>
+          <p:cNvSpPr>
+            <a:spLocks noGrp="1"/>
+          </p:cNvSpPr>
+          <p:nvPr>
+            <p:ph idx="1"/>
+          </p:nvPr>
+        </p:nvSpPr>
+        <p:spPr/>
+        <p:txBody>
+          <a:bodyPr/>
+          <a:lstStyle/>
+          <a:p>
+            <a:r>
+              <a:rPr lang="en-GB" dirty="0" smtClean="0"/>
+              <a:t>In order to have a full working account, consumers and tradesmen must provide a working email where they’ll be sent a verification link. The user won’t be able to login until the account has been verified.</a:t>
+            </a:r>
+            <a:endParaRPr lang="en-US" dirty="0"/>
+          </a:p>
+        </p:txBody>
+      </p:sp>
+      <p:sp>
+        <p:nvSpPr>
+          <p:cNvPr id="3" name="Title 2"/>
+          <p:cNvSpPr>
+            <a:spLocks noGrp="1"/>
+          </p:cNvSpPr>
+          <p:nvPr>
+            <p:ph type="title"/>
+          </p:nvPr>
+        </p:nvSpPr>
+        <p:spPr/>
+        <p:txBody>
+          <a:bodyPr/>
+          <a:lstStyle/>
+          <a:p>
+            <a:r>
+              <a:rPr lang="en-GB" dirty="0" smtClean="0"/>
+              <a:t>Email Verification</a:t>
+            </a:r>
+            <a:endParaRPr lang="en-US" dirty="0"/>
+          </a:p>
+        </p:txBody>
+      </p:sp>
+    </p:spTree>
+    <p:extLst>
+      <p:ext uri="{BB962C8B-B14F-4D97-AF65-F5344CB8AC3E}">
+        <p14:creationId xmlns:p14="http://schemas.microsoft.com/office/powerpoint/2010/main" val="4150670442"/>
+      </p:ext>
+    </p:extLst>
+  </p:cSld>
+  <p:clrMapOvr>
+    <a:masterClrMapping/>
+  </p:clrMapOvr>
+  <mc:AlternateContent xmlns:mc="http://schemas.openxmlformats.org/markup-compatibility/2006" xmlns:p14="http://schemas.microsoft.com/office/powerpoint/2010/main">
+    <mc:Choice Requires="p14">
+      <p:transition spd="med" p14:dur="700">
+        <p:fade/>
+      </p:transition>
+    </mc:Choice>
+    <mc:Fallback xmlns="">
+      <p:transition spd="med">
+        <p:fade/>
+      </p:transition>
+    </mc:Fallback>
+  </mc:AlternateContent>
+</p:sld>
+</file>
+
+<file path=ppt/slides/slide8.xml><?xml version="1.0" encoding="utf-8"?>
 <p:sld xmlns:a="http://schemas.openxmlformats.org/drawingml/2006/main" xmlns:r="http://schemas.openxmlformats.org/officeDocument/2006/relationships" xmlns:p="http://schemas.openxmlformats.org/presentationml/2006/main">
   <p:cSld>
     <p:spTree>

</xml_diff>

<commit_message>
updated the ppt, I added a slide on the phpBB software thet we're going to use for the jobs board.
</commit_message>
<xml_diff>
--- a/TradesmenDirectory.pptx
+++ b/TradesmenDirectory.pptx
@@ -226,7 +226,7 @@
           <a:p>
             <a:fld id="{C9DC3787-D225-4F78-8E71-4DD8FC1EC8F1}" type="datetimeFigureOut">
               <a:rPr lang="en-US" smtClean="0"/>
-              <a:t>11/30/2015</a:t>
+              <a:t>12/1/2015</a:t>
             </a:fld>
             <a:endParaRPr lang="en-US"/>
           </a:p>
@@ -391,7 +391,7 @@
           <a:p>
             <a:fld id="{459E625E-096F-494B-B7CE-A49E276A3A39}" type="datetimeFigureOut">
               <a:rPr lang="en-US" smtClean="0"/>
-              <a:t>11/30/2015</a:t>
+              <a:t>12/1/2015</a:t>
             </a:fld>
             <a:endParaRPr lang="en-US"/>
           </a:p>
@@ -3371,7 +3371,7 @@
           <a:p>
             <a:fld id="{35FB4A4D-BEB3-42DE-8D0E-DB8F0B5DA3ED}" type="datetime1">
               <a:rPr lang="en-US" smtClean="0"/>
-              <a:t>11/30/2015</a:t>
+              <a:t>12/1/2015</a:t>
             </a:fld>
             <a:endParaRPr lang="en-US"/>
           </a:p>
@@ -3800,7 +3800,7 @@
           <a:p>
             <a:fld id="{23DA557D-1DB1-46C0-998A-94433545C341}" type="datetime1">
               <a:rPr lang="en-US" smtClean="0"/>
-              <a:t>11/30/2015</a:t>
+              <a:t>12/1/2015</a:t>
             </a:fld>
             <a:endParaRPr lang="en-US"/>
           </a:p>
@@ -3982,7 +3982,7 @@
           <a:p>
             <a:fld id="{979A610B-0B0E-4C6C-A7A6-0853CA34DDCA}" type="datetime1">
               <a:rPr lang="en-US" smtClean="0"/>
-              <a:t>11/30/2015</a:t>
+              <a:t>12/1/2015</a:t>
             </a:fld>
             <a:endParaRPr lang="en-US"/>
           </a:p>
@@ -4174,7 +4174,7 @@
           <a:p>
             <a:fld id="{2FF0C144-8206-4C57-B7F2-12168FDC6C23}" type="datetime1">
               <a:rPr lang="en-US" smtClean="0"/>
-              <a:t>11/30/2015</a:t>
+              <a:t>12/1/2015</a:t>
             </a:fld>
             <a:endParaRPr lang="en-US"/>
           </a:p>
@@ -4356,7 +4356,7 @@
           <a:p>
             <a:fld id="{664C8FB8-1142-402E-8BCA-4DC30F103E56}" type="datetime1">
               <a:rPr lang="en-US" smtClean="0"/>
-              <a:t>11/30/2015</a:t>
+              <a:t>12/1/2015</a:t>
             </a:fld>
             <a:endParaRPr lang="en-US"/>
           </a:p>
@@ -4614,7 +4614,7 @@
           <a:p>
             <a:fld id="{065BCBAD-D360-40D3-A33A-B189CE27C2FB}" type="datetime1">
               <a:rPr lang="en-US" smtClean="0"/>
-              <a:t>11/30/2015</a:t>
+              <a:t>12/1/2015</a:t>
             </a:fld>
             <a:endParaRPr lang="en-US"/>
           </a:p>
@@ -4858,7 +4858,7 @@
           <a:p>
             <a:fld id="{6A93471D-48A1-4899-AFFF-8ACC56D03BF3}" type="datetime1">
               <a:rPr lang="en-US" smtClean="0"/>
-              <a:t>11/30/2015</a:t>
+              <a:t>12/1/2015</a:t>
             </a:fld>
             <a:endParaRPr lang="en-US"/>
           </a:p>
@@ -5300,7 +5300,7 @@
           <a:p>
             <a:fld id="{44400513-7D68-4635-8489-06A9AFAAD13D}" type="datetime1">
               <a:rPr lang="en-US" smtClean="0"/>
-              <a:t>11/30/2015</a:t>
+              <a:t>12/1/2015</a:t>
             </a:fld>
             <a:endParaRPr lang="en-US"/>
           </a:p>
@@ -5430,7 +5430,7 @@
           <a:p>
             <a:fld id="{746736AC-4807-4E91-B671-F9B91617C7B3}" type="datetime1">
               <a:rPr lang="en-US" smtClean="0"/>
-              <a:t>11/30/2015</a:t>
+              <a:t>12/1/2015</a:t>
             </a:fld>
             <a:endParaRPr lang="en-US"/>
           </a:p>
@@ -8098,7 +8098,7 @@
           <a:p>
             <a:fld id="{1222DBCC-10C7-4CB5-9734-C5542D870FBB}" type="datetime1">
               <a:rPr lang="en-US" smtClean="0"/>
-              <a:t>11/30/2015</a:t>
+              <a:t>12/1/2015</a:t>
             </a:fld>
             <a:endParaRPr lang="en-US"/>
           </a:p>
@@ -11153,7 +11153,7 @@
           <a:p>
             <a:fld id="{223346AD-5C1D-4E35-A3CE-CF8952DE9936}" type="datetime1">
               <a:rPr lang="en-US" smtClean="0"/>
-              <a:t>11/30/2015</a:t>
+              <a:t>12/1/2015</a:t>
             </a:fld>
             <a:endParaRPr lang="en-US"/>
           </a:p>
@@ -14071,7 +14071,7 @@
           <a:p>
             <a:fld id="{EED287B1-10B2-498E-AB88-8F08CA169E5C}" type="datetime1">
               <a:rPr lang="en-US" smtClean="0"/>
-              <a:t>11/30/2015</a:t>
+              <a:t>12/1/2015</a:t>
             </a:fld>
             <a:endParaRPr lang="en-US"/>
           </a:p>
@@ -15031,11 +15031,7 @@
           <a:p>
             <a:r>
               <a:rPr lang="en-GB" dirty="0" smtClean="0"/>
-              <a:t>Email </a:t>
-            </a:r>
-            <a:r>
-              <a:rPr lang="en-GB" dirty="0" smtClean="0"/>
-              <a:t>verification</a:t>
+              <a:t>Email verification</a:t>
             </a:r>
           </a:p>
           <a:p>
@@ -15356,7 +15352,53 @@
           <a:p>
             <a:r>
               <a:rPr lang="en-GB" dirty="0" smtClean="0"/>
-              <a:t>Verified consumers will have the ability to advertise jobs on the job board, where tradesmen can reply back to them.</a:t>
+              <a:t>Verified consumers will have the ability to advertise jobs on the job board, </a:t>
+            </a:r>
+            <a:r>
+              <a:rPr lang="en-GB" dirty="0" smtClean="0"/>
+              <a:t>where </a:t>
+            </a:r>
+            <a:r>
+              <a:rPr lang="en-GB" dirty="0" smtClean="0"/>
+              <a:t>tradesmen can reply back to them</a:t>
+            </a:r>
+            <a:r>
+              <a:rPr lang="en-GB" dirty="0" smtClean="0"/>
+              <a:t>.</a:t>
+            </a:r>
+          </a:p>
+          <a:p>
+            <a:r>
+              <a:rPr lang="en-GB" dirty="0" smtClean="0"/>
+              <a:t>The jobs board is created using a software called phpBB.</a:t>
+            </a:r>
+          </a:p>
+          <a:p>
+            <a:r>
+              <a:rPr lang="en-GB" dirty="0" smtClean="0"/>
+              <a:t>phpBB</a:t>
+            </a:r>
+            <a:r>
+              <a:rPr lang="en-GB" dirty="0"/>
+              <a:t> is </a:t>
+            </a:r>
+            <a:r>
+              <a:rPr lang="en-GB" dirty="0" smtClean="0"/>
+              <a:t>a </a:t>
+            </a:r>
+            <a:r>
+              <a:rPr lang="en-GB" dirty="0"/>
+              <a:t>widely used open source bulletin board system in the </a:t>
+            </a:r>
+            <a:r>
+              <a:rPr lang="en-GB" dirty="0" smtClean="0"/>
+              <a:t>world.</a:t>
+            </a:r>
+          </a:p>
+          <a:p>
+            <a:r>
+              <a:rPr lang="en-GB" dirty="0" smtClean="0"/>
+              <a:t>It supports private messaging. Which we can use to allow consumers and tradesmen to message each other on the site.</a:t>
             </a:r>
           </a:p>
         </p:txBody>

</xml_diff>